<commit_message>
+ added ETCE/IoT L02
</commit_message>
<xml_diff>
--- a/IoT-and-Digitalization-for-the-Circular-Economy/IoT-CE-L00-Organization.pptx
+++ b/IoT-and-Digitalization-for-the-Circular-Economy/IoT-CE-L00-Organization.pptx
@@ -356,7 +356,7 @@
             <a:pPr indent="0" algn="r">
               <a:buNone/>
             </a:pPr>
-            <a:fld id="{4E562C2C-2CA0-4D90-9671-643CEF22E941}" type="slidenum">
+            <a:fld id="{9C320557-3564-4E4C-885C-960BDB9E0642}" type="slidenum">
               <a:rPr b="0" lang="en-GB" sz="1400" spc="-1" strike="noStrike">
                 <a:solidFill>
                   <a:srgbClr val="000000"/>
@@ -410,7 +410,7 @@
         <p:spPr>
           <a:xfrm>
             <a:off x="533520" y="763560"/>
-            <a:ext cx="6694920" cy="3763080"/>
+            <a:ext cx="6694560" cy="3762720"/>
           </a:xfrm>
           <a:prstGeom prst="rect">
             <a:avLst/>
@@ -433,7 +433,7 @@
         <p:spPr>
           <a:xfrm>
             <a:off x="777240" y="4777560"/>
-            <a:ext cx="6208560" cy="4516920"/>
+            <a:ext cx="6208200" cy="4516560"/>
           </a:xfrm>
           <a:prstGeom prst="rect">
             <a:avLst/>
@@ -469,7 +469,7 @@
         <p:spPr>
           <a:xfrm>
             <a:off x="4399200" y="9555480"/>
-            <a:ext cx="3363840" cy="493560"/>
+            <a:ext cx="3363480" cy="493200"/>
           </a:xfrm>
           <a:prstGeom prst="rect">
             <a:avLst/>
@@ -495,7 +495,7 @@
                 <a:spcPct val="100000"/>
               </a:lnSpc>
             </a:pPr>
-            <a:fld id="{31DAC0BB-D3BA-47D3-9763-C932D0C21A1D}" type="slidenum">
+            <a:fld id="{A2542B8C-2253-48D2-9E8E-2BBBF4245F0D}" type="slidenum">
               <a:rPr b="0" lang="en-GB" sz="1800" spc="-1" strike="noStrike">
                 <a:solidFill>
                   <a:srgbClr val="000000"/>
@@ -503,7 +503,7 @@
                 <a:latin typeface="+mn-lt"/>
                 <a:ea typeface="+mn-ea"/>
               </a:rPr>
-              <a:t>&lt;number&gt;</a:t>
+              <a:t>6</a:t>
             </a:fld>
             <a:endParaRPr b="0" lang="en-GB" sz="1800" spc="-1" strike="noStrike">
               <a:solidFill>
@@ -549,7 +549,7 @@
         <p:spPr>
           <a:xfrm>
             <a:off x="533520" y="763560"/>
-            <a:ext cx="6692040" cy="3760200"/>
+            <a:ext cx="6691680" cy="3759840"/>
           </a:xfrm>
           <a:prstGeom prst="rect">
             <a:avLst/>
@@ -572,7 +572,7 @@
         <p:spPr>
           <a:xfrm>
             <a:off x="777240" y="4777560"/>
-            <a:ext cx="6205680" cy="4514040"/>
+            <a:ext cx="6205320" cy="4513680"/>
           </a:xfrm>
           <a:prstGeom prst="rect">
             <a:avLst/>
@@ -608,7 +608,7 @@
         <p:spPr>
           <a:xfrm>
             <a:off x="4399200" y="9555480"/>
-            <a:ext cx="3360960" cy="490680"/>
+            <a:ext cx="3360600" cy="490320"/>
           </a:xfrm>
           <a:prstGeom prst="rect">
             <a:avLst/>
@@ -634,7 +634,7 @@
                 <a:spcPct val="100000"/>
               </a:lnSpc>
             </a:pPr>
-            <a:fld id="{EF605548-DBC9-4AED-BE40-22E1998AF915}" type="slidenum">
+            <a:fld id="{350E7A43-C324-4826-93FB-86A57EE430BD}" type="slidenum">
               <a:rPr b="0" lang="de-DE" sz="1800" spc="-1" strike="noStrike">
                 <a:solidFill>
                   <a:srgbClr val="000000"/>
@@ -688,7 +688,7 @@
         <p:spPr>
           <a:xfrm>
             <a:off x="533520" y="763560"/>
-            <a:ext cx="6692040" cy="3760200"/>
+            <a:ext cx="6691680" cy="3759840"/>
           </a:xfrm>
           <a:prstGeom prst="rect">
             <a:avLst/>
@@ -711,7 +711,7 @@
         <p:spPr>
           <a:xfrm>
             <a:off x="777240" y="4777560"/>
-            <a:ext cx="6205680" cy="4514040"/>
+            <a:ext cx="6205320" cy="4513680"/>
           </a:xfrm>
           <a:prstGeom prst="rect">
             <a:avLst/>
@@ -747,7 +747,7 @@
         <p:spPr>
           <a:xfrm>
             <a:off x="4399200" y="9555480"/>
-            <a:ext cx="3360960" cy="490680"/>
+            <a:ext cx="3360600" cy="490320"/>
           </a:xfrm>
           <a:prstGeom prst="rect">
             <a:avLst/>
@@ -773,7 +773,7 @@
                 <a:spcPct val="100000"/>
               </a:lnSpc>
             </a:pPr>
-            <a:fld id="{73BA38C6-4577-4286-9BB8-27613DBE6E19}" type="slidenum">
+            <a:fld id="{94E441FC-8938-4337-80E1-170F283F6CC7}" type="slidenum">
               <a:rPr b="0" lang="de-DE" sz="1800" spc="-1" strike="noStrike">
                 <a:solidFill>
                   <a:srgbClr val="000000"/>
@@ -4378,7 +4378,7 @@
         <p:spPr>
           <a:xfrm>
             <a:off x="11444760" y="0"/>
-            <a:ext cx="739080" cy="6847920"/>
+            <a:ext cx="738720" cy="6847560"/>
           </a:xfrm>
           <a:prstGeom prst="rect">
             <a:avLst/>
@@ -4427,7 +4427,7 @@
         <p:spPr>
           <a:xfrm>
             <a:off x="11438640" y="6453360"/>
-            <a:ext cx="756000" cy="363960"/>
+            <a:ext cx="755640" cy="363960"/>
           </a:xfrm>
           <a:prstGeom prst="rect">
             <a:avLst/>
@@ -4453,7 +4453,7 @@
                 <a:spcPct val="100000"/>
               </a:lnSpc>
             </a:pPr>
-            <a:fld id="{079375F7-5D35-4A2B-8523-B3617AC69BB6}" type="slidenum">
+            <a:fld id="{8FF6E3B0-10A5-47A9-B80C-6680D57372CF}" type="slidenum">
               <a:rPr b="0" lang="en-US" sz="1800" spc="-1" strike="noStrike">
                 <a:solidFill>
                   <a:srgbClr val="808080"/>
@@ -4481,7 +4481,7 @@
         <p:spPr>
           <a:xfrm>
             <a:off x="912240" y="1268280"/>
-            <a:ext cx="9205920" cy="359280"/>
+            <a:ext cx="9205560" cy="358920"/>
           </a:xfrm>
           <a:prstGeom prst="rect">
             <a:avLst/>
@@ -4530,7 +4530,7 @@
         <p:spPr>
           <a:xfrm>
             <a:off x="0" y="0"/>
-            <a:ext cx="3049920" cy="559800"/>
+            <a:ext cx="3049560" cy="559440"/>
           </a:xfrm>
           <a:prstGeom prst="rect">
             <a:avLst/>
@@ -4553,7 +4553,7 @@
         <p:spPr>
           <a:xfrm>
             <a:off x="7430400" y="134640"/>
-            <a:ext cx="3695760" cy="511920"/>
+            <a:ext cx="3695400" cy="511560"/>
           </a:xfrm>
           <a:prstGeom prst="rect">
             <a:avLst/>
@@ -4572,7 +4572,7 @@
         <p:spPr>
           <a:xfrm>
             <a:off x="912240" y="1268280"/>
-            <a:ext cx="9205920" cy="359280"/>
+            <a:ext cx="9205560" cy="358920"/>
           </a:xfrm>
           <a:prstGeom prst="rect">
             <a:avLst/>
@@ -4617,7 +4617,7 @@
         <p:spPr>
           <a:xfrm>
             <a:off x="11444760" y="0"/>
-            <a:ext cx="739080" cy="6847920"/>
+            <a:ext cx="738720" cy="6847560"/>
           </a:xfrm>
           <a:prstGeom prst="rect">
             <a:avLst/>
@@ -4666,7 +4666,7 @@
         <p:spPr>
           <a:xfrm>
             <a:off x="0" y="6642720"/>
-            <a:ext cx="12182040" cy="211320"/>
+            <a:ext cx="12181680" cy="211320"/>
           </a:xfrm>
           <a:prstGeom prst="rect">
             <a:avLst/>
@@ -5038,7 +5038,7 @@
         <p:spPr>
           <a:xfrm>
             <a:off x="11444760" y="0"/>
-            <a:ext cx="739080" cy="6847920"/>
+            <a:ext cx="738720" cy="6847560"/>
           </a:xfrm>
           <a:prstGeom prst="rect">
             <a:avLst/>
@@ -5087,7 +5087,7 @@
         <p:spPr>
           <a:xfrm>
             <a:off x="11438640" y="6453360"/>
-            <a:ext cx="756000" cy="363960"/>
+            <a:ext cx="755640" cy="363960"/>
           </a:xfrm>
           <a:prstGeom prst="rect">
             <a:avLst/>
@@ -5113,7 +5113,7 @@
                 <a:spcPct val="100000"/>
               </a:lnSpc>
             </a:pPr>
-            <a:fld id="{8E3327F3-D164-499E-9C26-B05EE19F7EBD}" type="slidenum">
+            <a:fld id="{269CC683-6CA1-4557-AD4D-680795F5B826}" type="slidenum">
               <a:rPr b="0" lang="en-US" sz="1800" spc="-1" strike="noStrike">
                 <a:solidFill>
                   <a:srgbClr val="808080"/>
@@ -5141,7 +5141,7 @@
         <p:spPr>
           <a:xfrm>
             <a:off x="912240" y="1268280"/>
-            <a:ext cx="9205920" cy="359280"/>
+            <a:ext cx="9205560" cy="358920"/>
           </a:xfrm>
           <a:prstGeom prst="rect">
             <a:avLst/>
@@ -5190,7 +5190,7 @@
         <p:spPr>
           <a:xfrm>
             <a:off x="0" y="0"/>
-            <a:ext cx="3049920" cy="559800"/>
+            <a:ext cx="3049560" cy="559440"/>
           </a:xfrm>
           <a:prstGeom prst="rect">
             <a:avLst/>
@@ -5213,7 +5213,7 @@
         <p:spPr>
           <a:xfrm>
             <a:off x="7430400" y="134640"/>
-            <a:ext cx="3695760" cy="511920"/>
+            <a:ext cx="3695400" cy="511560"/>
           </a:xfrm>
           <a:prstGeom prst="rect">
             <a:avLst/>
@@ -5232,7 +5232,7 @@
         <p:spPr>
           <a:xfrm>
             <a:off x="11444760" y="0"/>
-            <a:ext cx="739080" cy="6847920"/>
+            <a:ext cx="738720" cy="6847560"/>
           </a:xfrm>
           <a:prstGeom prst="rect">
             <a:avLst/>
@@ -5281,7 +5281,7 @@
         <p:spPr>
           <a:xfrm>
             <a:off x="11438640" y="6453360"/>
-            <a:ext cx="756000" cy="363960"/>
+            <a:ext cx="755640" cy="363960"/>
           </a:xfrm>
           <a:prstGeom prst="rect">
             <a:avLst/>
@@ -5307,7 +5307,7 @@
                 <a:spcPct val="100000"/>
               </a:lnSpc>
             </a:pPr>
-            <a:fld id="{4AADE54E-4A9F-4EF4-8D45-805B30FB2185}" type="slidenum">
+            <a:fld id="{F9FABC7D-2511-4861-AE78-15202CF46EF8}" type="slidenum">
               <a:rPr b="0" lang="en-US" sz="1800" spc="-1" strike="noStrike">
                 <a:solidFill>
                   <a:srgbClr val="808080"/>
@@ -5335,7 +5335,7 @@
         <p:spPr>
           <a:xfrm>
             <a:off x="0" y="6642720"/>
-            <a:ext cx="12182040" cy="211320"/>
+            <a:ext cx="12181680" cy="211320"/>
           </a:xfrm>
           <a:prstGeom prst="rect">
             <a:avLst/>
@@ -5700,7 +5700,7 @@
         <p:spPr>
           <a:xfrm>
             <a:off x="527400" y="1412640"/>
-            <a:ext cx="10359000" cy="1145520"/>
+            <a:ext cx="10358640" cy="1145160"/>
           </a:xfrm>
           <a:prstGeom prst="rect">
             <a:avLst/>
@@ -5754,7 +5754,7 @@
         <p:spPr>
           <a:xfrm>
             <a:off x="527400" y="2852640"/>
-            <a:ext cx="10359000" cy="2366280"/>
+            <a:ext cx="10358640" cy="2365920"/>
           </a:xfrm>
           <a:prstGeom prst="rect">
             <a:avLst/>
@@ -5998,7 +5998,7 @@
         <p:spPr>
           <a:xfrm>
             <a:off x="335520" y="764640"/>
-            <a:ext cx="10743120" cy="493920"/>
+            <a:ext cx="10742760" cy="493560"/>
           </a:xfrm>
           <a:prstGeom prst="rect">
             <a:avLst/>
@@ -6056,7 +6056,7 @@
         <p:spPr>
           <a:xfrm>
             <a:off x="371520" y="1620000"/>
-            <a:ext cx="10606680" cy="4399200"/>
+            <a:ext cx="10606320" cy="4398840"/>
           </a:xfrm>
           <a:prstGeom prst="rect">
             <a:avLst/>
@@ -6105,7 +6105,7 @@
         <p:spPr>
           <a:xfrm>
             <a:off x="335520" y="764640"/>
-            <a:ext cx="10743120" cy="493920"/>
+            <a:ext cx="10742760" cy="493560"/>
           </a:xfrm>
           <a:prstGeom prst="rect">
             <a:avLst/>
@@ -6185,7 +6185,7 @@
         <p:spPr>
           <a:xfrm>
             <a:off x="335520" y="1268640"/>
-            <a:ext cx="10743120" cy="5030640"/>
+            <a:ext cx="10742760" cy="5030280"/>
           </a:xfrm>
           <a:prstGeom prst="rect">
             <a:avLst/>
@@ -6770,7 +6770,7 @@
         <p:spPr>
           <a:xfrm>
             <a:off x="335520" y="764640"/>
-            <a:ext cx="10743120" cy="493920"/>
+            <a:ext cx="10742760" cy="493560"/>
           </a:xfrm>
           <a:prstGeom prst="rect">
             <a:avLst/>
@@ -6824,7 +6824,7 @@
         <p:spPr>
           <a:xfrm>
             <a:off x="335520" y="1268280"/>
-            <a:ext cx="10743120" cy="5030640"/>
+            <a:ext cx="10742760" cy="5030280"/>
           </a:xfrm>
           <a:prstGeom prst="rect">
             <a:avLst/>
@@ -7244,7 +7244,7 @@
         <p:spPr>
           <a:xfrm>
             <a:off x="335520" y="764640"/>
-            <a:ext cx="10743120" cy="493920"/>
+            <a:ext cx="10742760" cy="493560"/>
           </a:xfrm>
           <a:prstGeom prst="rect">
             <a:avLst/>
@@ -7298,7 +7298,7 @@
         <p:spPr>
           <a:xfrm>
             <a:off x="335520" y="1268640"/>
-            <a:ext cx="10743120" cy="5030640"/>
+            <a:ext cx="10742760" cy="5030280"/>
           </a:xfrm>
           <a:prstGeom prst="rect">
             <a:avLst/>
@@ -7599,7 +7599,7 @@
         <p:spPr>
           <a:xfrm>
             <a:off x="335520" y="764640"/>
-            <a:ext cx="10743120" cy="493920"/>
+            <a:ext cx="10742760" cy="493560"/>
           </a:xfrm>
           <a:prstGeom prst="rect">
             <a:avLst/>
@@ -7653,7 +7653,7 @@
         <p:spPr>
           <a:xfrm>
             <a:off x="335520" y="1268280"/>
-            <a:ext cx="10743120" cy="5030640"/>
+            <a:ext cx="10742760" cy="5030280"/>
           </a:xfrm>
           <a:prstGeom prst="rect">
             <a:avLst/>
@@ -7749,7 +7749,7 @@
         <p:spPr>
           <a:xfrm>
             <a:off x="6285600" y="2132640"/>
-            <a:ext cx="512640" cy="492480"/>
+            <a:ext cx="512280" cy="492120"/>
           </a:xfrm>
           <a:prstGeom prst="star5">
             <a:avLst>
@@ -7810,7 +7810,7 @@
         <p:spPr>
           <a:xfrm>
             <a:off x="4089960" y="2247480"/>
-            <a:ext cx="2280960" cy="363960"/>
+            <a:ext cx="2280600" cy="363960"/>
           </a:xfrm>
           <a:prstGeom prst="rect">
             <a:avLst/>
@@ -7914,7 +7914,7 @@
         <p:spPr>
           <a:xfrm>
             <a:off x="335520" y="764640"/>
-            <a:ext cx="10743120" cy="493920"/>
+            <a:ext cx="10742760" cy="493560"/>
           </a:xfrm>
           <a:prstGeom prst="rect">
             <a:avLst/>
@@ -7968,7 +7968,7 @@
         <p:spPr>
           <a:xfrm>
             <a:off x="335520" y="1268640"/>
-            <a:ext cx="10743120" cy="5030640"/>
+            <a:ext cx="10742760" cy="5030280"/>
           </a:xfrm>
           <a:prstGeom prst="rect">
             <a:avLst/>
@@ -8357,7 +8357,7 @@
         <p:spPr>
           <a:xfrm>
             <a:off x="335520" y="764640"/>
-            <a:ext cx="10741320" cy="492120"/>
+            <a:ext cx="10740960" cy="491760"/>
           </a:xfrm>
           <a:prstGeom prst="rect">
             <a:avLst/>
@@ -8411,7 +8411,7 @@
         <p:spPr>
           <a:xfrm>
             <a:off x="335520" y="1268640"/>
-            <a:ext cx="10741320" cy="5028840"/>
+            <a:ext cx="10740960" cy="5028480"/>
           </a:xfrm>
           <a:prstGeom prst="rect">
             <a:avLst/>
@@ -8624,7 +8624,7 @@
         <p:spPr>
           <a:xfrm>
             <a:off x="335520" y="1268640"/>
-            <a:ext cx="10743120" cy="5030640"/>
+            <a:ext cx="10742760" cy="5030280"/>
           </a:xfrm>
           <a:prstGeom prst="rect">
             <a:avLst/>
@@ -8684,7 +8684,7 @@
         <p:spPr>
           <a:xfrm>
             <a:off x="335520" y="764640"/>
-            <a:ext cx="10743120" cy="493920"/>
+            <a:ext cx="10742760" cy="493560"/>
           </a:xfrm>
           <a:prstGeom prst="rect">
             <a:avLst/>
@@ -8759,7 +8759,7 @@
         <p:spPr>
           <a:xfrm>
             <a:off x="335520" y="764640"/>
-            <a:ext cx="10737360" cy="488160"/>
+            <a:ext cx="10737000" cy="487800"/>
           </a:xfrm>
           <a:prstGeom prst="rect">
             <a:avLst/>
@@ -8813,7 +8813,7 @@
         <p:spPr>
           <a:xfrm>
             <a:off x="335520" y="1268280"/>
-            <a:ext cx="10737360" cy="5024880"/>
+            <a:ext cx="10737000" cy="5024520"/>
           </a:xfrm>
           <a:prstGeom prst="rect">
             <a:avLst/>
@@ -9047,7 +9047,7 @@
         <p:spPr>
           <a:xfrm>
             <a:off x="335520" y="764640"/>
-            <a:ext cx="10743120" cy="493920"/>
+            <a:ext cx="10742760" cy="493560"/>
           </a:xfrm>
           <a:prstGeom prst="rect">
             <a:avLst/>
@@ -9105,7 +9105,7 @@
         <p:spPr>
           <a:xfrm>
             <a:off x="1784520" y="1710720"/>
-            <a:ext cx="1465920" cy="2167200"/>
+            <a:ext cx="1465560" cy="2166840"/>
           </a:xfrm>
           <a:prstGeom prst="rect">
             <a:avLst/>
@@ -9128,7 +9128,7 @@
         <p:spPr>
           <a:xfrm>
             <a:off x="7395480" y="2082600"/>
-            <a:ext cx="1779840" cy="1771920"/>
+            <a:ext cx="1779480" cy="1771560"/>
           </a:xfrm>
           <a:prstGeom prst="rect">
             <a:avLst/>
@@ -9147,7 +9147,7 @@
         <p:spPr>
           <a:xfrm>
             <a:off x="720000" y="3826800"/>
-            <a:ext cx="3630600" cy="672120"/>
+            <a:ext cx="3630240" cy="671760"/>
           </a:xfrm>
           <a:prstGeom prst="rect">
             <a:avLst/>
@@ -9220,7 +9220,7 @@
         <p:spPr>
           <a:xfrm>
             <a:off x="6448320" y="3826800"/>
-            <a:ext cx="3630600" cy="672120"/>
+            <a:ext cx="3630240" cy="671760"/>
           </a:xfrm>
           <a:prstGeom prst="rect">
             <a:avLst/>
@@ -9293,7 +9293,7 @@
         <p:spPr>
           <a:xfrm>
             <a:off x="3569040" y="5987160"/>
-            <a:ext cx="3629880" cy="671400"/>
+            <a:ext cx="3629520" cy="671040"/>
           </a:xfrm>
           <a:prstGeom prst="rect">
             <a:avLst/>
@@ -9355,7 +9355,7 @@
         <p:spPr>
           <a:xfrm>
             <a:off x="4649040" y="4140000"/>
-            <a:ext cx="1438560" cy="1922400"/>
+            <a:ext cx="1438200" cy="1922040"/>
           </a:xfrm>
           <a:prstGeom prst="rect">
             <a:avLst/>
@@ -9404,7 +9404,7 @@
         <p:spPr>
           <a:xfrm>
             <a:off x="542880" y="721800"/>
-            <a:ext cx="10351800" cy="492480"/>
+            <a:ext cx="10351440" cy="492120"/>
           </a:xfrm>
           <a:prstGeom prst="rect">
             <a:avLst/>
@@ -9458,7 +9458,7 @@
         <p:spPr>
           <a:xfrm>
             <a:off x="451800" y="1709280"/>
-            <a:ext cx="8219160" cy="4347360"/>
+            <a:ext cx="8218800" cy="4347000"/>
           </a:xfrm>
           <a:prstGeom prst="rect">
             <a:avLst/>
@@ -9503,7 +9503,7 @@
         <p:spPr>
           <a:xfrm>
             <a:off x="609480" y="1769400"/>
-            <a:ext cx="10582200" cy="4850280"/>
+            <a:ext cx="10581840" cy="4849920"/>
           </a:xfrm>
           <a:prstGeom prst="rect">
             <a:avLst/>
@@ -9986,7 +9986,7 @@
         <p:spPr>
           <a:xfrm>
             <a:off x="542880" y="721800"/>
-            <a:ext cx="10348920" cy="489600"/>
+            <a:ext cx="10348560" cy="489240"/>
           </a:xfrm>
           <a:prstGeom prst="rect">
             <a:avLst/>
@@ -10040,7 +10040,7 @@
         <p:spPr>
           <a:xfrm>
             <a:off x="451800" y="1709280"/>
-            <a:ext cx="8216280" cy="4344480"/>
+            <a:ext cx="8215920" cy="4344120"/>
           </a:xfrm>
           <a:prstGeom prst="rect">
             <a:avLst/>
@@ -10085,7 +10085,7 @@
         <p:spPr>
           <a:xfrm>
             <a:off x="609480" y="1769400"/>
-            <a:ext cx="10579320" cy="4847400"/>
+            <a:ext cx="10578960" cy="4847040"/>
           </a:xfrm>
           <a:prstGeom prst="rect">
             <a:avLst/>
@@ -10516,7 +10516,7 @@
         <p:spPr>
           <a:xfrm>
             <a:off x="542880" y="721800"/>
-            <a:ext cx="10348920" cy="489600"/>
+            <a:ext cx="10348560" cy="489240"/>
           </a:xfrm>
           <a:prstGeom prst="rect">
             <a:avLst/>
@@ -10570,7 +10570,7 @@
         <p:spPr>
           <a:xfrm>
             <a:off x="451800" y="1709280"/>
-            <a:ext cx="8216280" cy="4344480"/>
+            <a:ext cx="8215920" cy="4344120"/>
           </a:xfrm>
           <a:prstGeom prst="rect">
             <a:avLst/>
@@ -10615,7 +10615,7 @@
         <p:spPr>
           <a:xfrm>
             <a:off x="609480" y="1769400"/>
-            <a:ext cx="10579320" cy="4847400"/>
+            <a:ext cx="10578960" cy="4847040"/>
           </a:xfrm>
           <a:prstGeom prst="rect">
             <a:avLst/>
@@ -10868,7 +10868,7 @@
         <p:spPr>
           <a:xfrm>
             <a:off x="335520" y="764640"/>
-            <a:ext cx="10742400" cy="493200"/>
+            <a:ext cx="10742040" cy="492840"/>
           </a:xfrm>
           <a:prstGeom prst="rect">
             <a:avLst/>
@@ -10922,7 +10922,7 @@
         <p:spPr>
           <a:xfrm>
             <a:off x="335520" y="1268640"/>
-            <a:ext cx="10742400" cy="5029920"/>
+            <a:ext cx="10742040" cy="5029560"/>
           </a:xfrm>
           <a:prstGeom prst="rect">
             <a:avLst/>
@@ -11245,7 +11245,7 @@
                 <a:latin typeface="DejaVu Sans"/>
                 <a:ea typeface="DejaVu Sans"/>
               </a:rPr>
-              <a:t>19.06.2023 → IoT in Mining I (L08)</a:t>
+              <a:t>19.06.2023 → No Lecture</a:t>
             </a:r>
             <a:endParaRPr b="0" lang="en-GB" sz="1800" spc="-1" strike="noStrike">
               <a:solidFill>
@@ -11277,7 +11277,7 @@
                 <a:latin typeface="DejaVu Sans"/>
                 <a:ea typeface="DejaVu Sans"/>
               </a:rPr>
-              <a:t>26.06.2023 → IoT in Mining II (L09)</a:t>
+              <a:t>26.06.2023 → IoT in Mining I (L08)</a:t>
             </a:r>
             <a:endParaRPr b="0" lang="en-GB" sz="1800" spc="-1" strike="noStrike">
               <a:solidFill>
@@ -11309,7 +11309,63 @@
                 <a:latin typeface="DejaVu Sans"/>
                 <a:ea typeface="DejaVu Sans"/>
               </a:rPr>
-              <a:t>03.07.2023 → Technologies for Sustainability – MOOC Content (L10)</a:t>
+              <a:t>03.07.2023 → </a:t>
+            </a:r>
+            <a:r>
+              <a:rPr b="1" lang="en-US" sz="1800" spc="-1" strike="noStrike">
+                <a:solidFill>
+                  <a:srgbClr val="000000"/>
+                </a:solidFill>
+                <a:latin typeface="DejaVu Sans"/>
+                <a:ea typeface="DejaVu Sans"/>
+              </a:rPr>
+              <a:t>IoT in Mining II (L09)</a:t>
+            </a:r>
+            <a:endParaRPr b="0" lang="en-GB" sz="1800" spc="-1" strike="noStrike">
+              <a:solidFill>
+                <a:srgbClr val="000000"/>
+              </a:solidFill>
+              <a:latin typeface="Arial"/>
+            </a:endParaRPr>
+          </a:p>
+          <a:p>
+            <a:pPr>
+              <a:lnSpc>
+                <a:spcPct val="100000"/>
+              </a:lnSpc>
+              <a:spcBef>
+                <a:spcPts val="360"/>
+              </a:spcBef>
+            </a:pPr>
+            <a:r>
+              <a:rPr b="1" lang="en-US" sz="1800" spc="-1" strike="noStrike">
+                <a:solidFill>
+                  <a:srgbClr val="000000"/>
+                </a:solidFill>
+                <a:latin typeface="DejaVu Sans"/>
+                <a:ea typeface="DejaVu Sans"/>
+              </a:rPr>
+              <a:t>	</a:t>
+            </a:r>
+            <a:r>
+              <a:rPr b="1" lang="en-US" sz="1800" spc="-1" strike="noStrike">
+                <a:solidFill>
+                  <a:srgbClr val="000000"/>
+                </a:solidFill>
+                <a:latin typeface="DejaVu Sans"/>
+                <a:ea typeface="DejaVu Sans"/>
+              </a:rPr>
+              <a:t>          → </a:t>
+            </a:r>
+            <a:r>
+              <a:rPr b="1" lang="en-US" sz="1800" spc="-1" strike="noStrike">
+                <a:solidFill>
+                  <a:srgbClr val="000000"/>
+                </a:solidFill>
+                <a:latin typeface="DejaVu Sans"/>
+                <a:ea typeface="DejaVu Sans"/>
+              </a:rPr>
+              <a:t>Technologies for Sustainability – MOOC Content (L10)</a:t>
             </a:r>
             <a:endParaRPr b="0" lang="en-GB" sz="1800" spc="-1" strike="noStrike">
               <a:solidFill>
@@ -11455,7 +11511,7 @@
         <p:spPr>
           <a:xfrm>
             <a:off x="539640" y="764640"/>
-            <a:ext cx="10746000" cy="496800"/>
+            <a:ext cx="10745640" cy="496440"/>
           </a:xfrm>
           <a:prstGeom prst="rect">
             <a:avLst/>
@@ -11509,7 +11565,7 @@
         <p:spPr>
           <a:xfrm>
             <a:off x="539640" y="1268640"/>
-            <a:ext cx="10746000" cy="5033520"/>
+            <a:ext cx="10745640" cy="5033160"/>
           </a:xfrm>
           <a:prstGeom prst="rect">
             <a:avLst/>
@@ -11712,7 +11768,7 @@
                 <a:latin typeface="DejaVu Sans"/>
                 <a:ea typeface="DejaVu Sans"/>
               </a:rPr>
-              <a:t>26.06.2023 → Exercise 06 – IoT in Mining</a:t>
+              <a:t>03.07.2023 → Exercise 06 – IoT in Mining</a:t>
             </a:r>
             <a:endParaRPr b="0" lang="en-GB" sz="1800" spc="-1" strike="noStrike">
               <a:solidFill>
@@ -11744,7 +11800,7 @@
                 <a:latin typeface="DejaVu Sans"/>
                 <a:ea typeface="DejaVu Sans"/>
               </a:rPr>
-              <a:t>03.07.2023 → Exercise 07 – Technology Assessment</a:t>
+              <a:t>10.07.2023 → Exercise 07 – Technology Assessment</a:t>
             </a:r>
             <a:endParaRPr b="0" lang="en-GB" sz="1800" spc="-1" strike="noStrike">
               <a:solidFill>
@@ -11794,7 +11850,7 @@
         <p:spPr>
           <a:xfrm>
             <a:off x="335520" y="764640"/>
-            <a:ext cx="10743120" cy="493920"/>
+            <a:ext cx="10742760" cy="493560"/>
           </a:xfrm>
           <a:prstGeom prst="rect">
             <a:avLst/>
@@ -11848,7 +11904,7 @@
         <p:spPr>
           <a:xfrm>
             <a:off x="335520" y="1268280"/>
-            <a:ext cx="10743120" cy="5030640"/>
+            <a:ext cx="10742760" cy="5030280"/>
           </a:xfrm>
           <a:prstGeom prst="rect">
             <a:avLst/>

</xml_diff>